<commit_message>
Docs: Update Alias sequence diagram
</commit_message>
<xml_diff>
--- a/docs/diagrams/AliasSequenceDiagram.pptx
+++ b/docs/diagrams/AliasSequenceDiagram.pptx
@@ -3614,8 +3614,8 @@
         </p:nvSpPr>
         <p:spPr>
           <a:xfrm>
-            <a:off x="4037902" y="3055895"/>
-            <a:ext cx="152399" cy="1408689"/>
+            <a:off x="4037902" y="3055896"/>
+            <a:ext cx="149887" cy="1394990"/>
           </a:xfrm>
           <a:prstGeom prst="rect">
             <a:avLst/>
@@ -3767,8 +3767,8 @@
         </p:nvSpPr>
         <p:spPr>
           <a:xfrm>
-            <a:off x="5791123" y="3140110"/>
-            <a:ext cx="131906" cy="822361"/>
+            <a:off x="5791122" y="3183991"/>
+            <a:ext cx="149259" cy="727122"/>
           </a:xfrm>
           <a:prstGeom prst="rect">
             <a:avLst/>

</xml_diff>